<commit_message>
Chỉnh sửa slide. Bổ sung kế hoạch trình bày.
</commit_message>
<xml_diff>
--- a/PA4/4. Slide/WARM.pptx
+++ b/PA4/4. Slide/WARM.pptx
@@ -5,10 +5,10 @@
     <p:sldMasterId id="2147483648" r:id="rId1"/>
   </p:sldMasterIdLst>
   <p:notesMasterIdLst>
-    <p:notesMasterId r:id="rId18"/>
+    <p:notesMasterId r:id="rId21"/>
   </p:notesMasterIdLst>
   <p:handoutMasterIdLst>
-    <p:handoutMasterId r:id="rId19"/>
+    <p:handoutMasterId r:id="rId22"/>
   </p:handoutMasterIdLst>
   <p:sldIdLst>
     <p:sldId id="256" r:id="rId2"/>
@@ -23,10 +23,13 @@
     <p:sldId id="298" r:id="rId11"/>
     <p:sldId id="299" r:id="rId12"/>
     <p:sldId id="300" r:id="rId13"/>
-    <p:sldId id="291" r:id="rId14"/>
-    <p:sldId id="287" r:id="rId15"/>
-    <p:sldId id="276" r:id="rId16"/>
-    <p:sldId id="286" r:id="rId17"/>
+    <p:sldId id="301" r:id="rId14"/>
+    <p:sldId id="302" r:id="rId15"/>
+    <p:sldId id="303" r:id="rId16"/>
+    <p:sldId id="291" r:id="rId17"/>
+    <p:sldId id="287" r:id="rId18"/>
+    <p:sldId id="276" r:id="rId19"/>
+    <p:sldId id="286" r:id="rId20"/>
   </p:sldIdLst>
   <p:sldSz cx="9144000" cy="6858000" type="screen4x3"/>
   <p:notesSz cx="6858000" cy="9144000"/>
@@ -175,10 +178,10 @@
           <c:layoutTarget val="inner"/>
           <c:xMode val="edge"/>
           <c:yMode val="edge"/>
-          <c:x val="7.2388831437435575E-2"/>
+          <c:x val="7.2388831437435602E-2"/>
           <c:y val="0.16610169491525423"/>
           <c:w val="0.85729058945191317"/>
-          <c:h val="0.66949152542373003"/>
+          <c:h val="0.66949152542373014"/>
         </c:manualLayout>
       </c:layout>
       <c:pie3DChart>
@@ -338,7 +341,7 @@
               <c:idx val="3"/>
               <c:layout>
                 <c:manualLayout>
-                  <c:x val="4.9430272538912599E-2"/>
+                  <c:x val="4.9430272538912606E-2"/>
                   <c:y val="8.8076831305177766E-2"/>
                 </c:manualLayout>
               </c:layout>
@@ -362,7 +365,7 @@
               <c:layout>
                 <c:manualLayout>
                   <c:x val="-0.17960033264157374"/>
-                  <c:y val="6.2378429968981318E-2"/>
+                  <c:y val="6.2378429968981339E-2"/>
                 </c:manualLayout>
               </c:layout>
               <c:tx>
@@ -1187,11 +1190,7 @@
             </a:r>
             <a:r>
               <a:rPr lang="en-US" baseline="0" smtClean="0"/>
-              <a:t> </a:t>
-            </a:r>
-            <a:r>
-              <a:rPr lang="en-US" baseline="0" smtClean="0"/>
-              <a:t>Management</a:t>
+              <a:t> Management</a:t>
             </a:r>
           </a:p>
           <a:p>
@@ -1425,7 +1424,7 @@
             <a:fld id="{896E4393-75D9-4774-85D5-EA38865C8C2D}" type="slidenum">
               <a:rPr lang="en-US" smtClean="0"/>
               <a:pPr/>
-              <a:t>13</a:t>
+              <a:t>16</a:t>
             </a:fld>
             <a:endParaRPr lang="en-US"/>
           </a:p>
@@ -1507,7 +1506,7 @@
             <a:fld id="{896E4393-75D9-4774-85D5-EA38865C8C2D}" type="slidenum">
               <a:rPr lang="en-US" smtClean="0"/>
               <a:pPr/>
-              <a:t>15</a:t>
+              <a:t>18</a:t>
             </a:fld>
             <a:endParaRPr lang="en-US"/>
           </a:p>
@@ -9930,15 +9929,7 @@
           <a:p>
             <a:r>
               <a:rPr lang="en-US" smtClean="0"/>
-              <a:t>GVTH: </a:t>
-            </a:r>
-            <a:r>
-              <a:rPr lang="en-US" smtClean="0"/>
-              <a:t>Hồ </a:t>
-            </a:r>
-            <a:r>
-              <a:rPr lang="en-US" smtClean="0"/>
-              <a:t>Tuấn Thanh</a:t>
+              <a:t>GVTH: Hồ Tuấn Thanh</a:t>
             </a:r>
             <a:endParaRPr lang="vi-VN"/>
           </a:p>
@@ -12972,6 +12963,194 @@
 </file>
 
 <file path=ppt/slides/slide13.xml><?xml version="1.0" encoding="utf-8"?>
+<p:sld xmlns:a="http://schemas.openxmlformats.org/drawingml/2006/main" xmlns:r="http://schemas.openxmlformats.org/officeDocument/2006/relationships" xmlns:p="http://schemas.openxmlformats.org/presentationml/2006/main">
+  <p:cSld>
+    <p:spTree>
+      <p:nvGrpSpPr>
+        <p:cNvPr id="1" name=""/>
+        <p:cNvGrpSpPr/>
+        <p:nvPr/>
+      </p:nvGrpSpPr>
+      <p:grpSpPr>
+        <a:xfrm>
+          <a:off x="0" y="0"/>
+          <a:ext cx="0" cy="0"/>
+          <a:chOff x="0" y="0"/>
+          <a:chExt cx="0" cy="0"/>
+        </a:xfrm>
+      </p:grpSpPr>
+      <p:pic>
+        <p:nvPicPr>
+          <p:cNvPr id="27" name="Picture 26"/>
+          <p:cNvPicPr/>
+          <p:nvPr/>
+        </p:nvPicPr>
+        <p:blipFill>
+          <a:blip r:embed="rId2" cstate="print"/>
+          <a:srcRect/>
+          <a:stretch>
+            <a:fillRect/>
+          </a:stretch>
+        </p:blipFill>
+        <p:spPr bwMode="auto">
+          <a:xfrm>
+            <a:off x="0" y="0"/>
+            <a:ext cx="9144000" cy="6858000"/>
+          </a:xfrm>
+          <a:prstGeom prst="rect">
+            <a:avLst/>
+          </a:prstGeom>
+          <a:noFill/>
+          <a:ln w="9525">
+            <a:noFill/>
+            <a:miter lim="800000"/>
+            <a:headEnd/>
+            <a:tailEnd/>
+          </a:ln>
+        </p:spPr>
+      </p:pic>
+    </p:spTree>
+  </p:cSld>
+  <p:clrMapOvr>
+    <a:masterClrMapping/>
+  </p:clrMapOvr>
+  <p:timing>
+    <p:tnLst>
+      <p:par>
+        <p:cTn id="1" dur="indefinite" restart="never" nodeType="tmRoot"/>
+      </p:par>
+    </p:tnLst>
+  </p:timing>
+</p:sld>
+</file>
+
+<file path=ppt/slides/slide14.xml><?xml version="1.0" encoding="utf-8"?>
+<p:sld xmlns:a="http://schemas.openxmlformats.org/drawingml/2006/main" xmlns:r="http://schemas.openxmlformats.org/officeDocument/2006/relationships" xmlns:p="http://schemas.openxmlformats.org/presentationml/2006/main">
+  <p:cSld>
+    <p:spTree>
+      <p:nvGrpSpPr>
+        <p:cNvPr id="1" name=""/>
+        <p:cNvGrpSpPr/>
+        <p:nvPr/>
+      </p:nvGrpSpPr>
+      <p:grpSpPr>
+        <a:xfrm>
+          <a:off x="0" y="0"/>
+          <a:ext cx="0" cy="0"/>
+          <a:chOff x="0" y="0"/>
+          <a:chExt cx="0" cy="0"/>
+        </a:xfrm>
+      </p:grpSpPr>
+      <p:pic>
+        <p:nvPicPr>
+          <p:cNvPr id="3" name="Picture 2"/>
+          <p:cNvPicPr/>
+          <p:nvPr/>
+        </p:nvPicPr>
+        <p:blipFill>
+          <a:blip r:embed="rId2" cstate="print"/>
+          <a:srcRect/>
+          <a:stretch>
+            <a:fillRect/>
+          </a:stretch>
+        </p:blipFill>
+        <p:spPr bwMode="auto">
+          <a:xfrm>
+            <a:off x="0" y="0"/>
+            <a:ext cx="9144000" cy="6858000"/>
+          </a:xfrm>
+          <a:prstGeom prst="rect">
+            <a:avLst/>
+          </a:prstGeom>
+          <a:noFill/>
+          <a:ln w="9525">
+            <a:noFill/>
+            <a:miter lim="800000"/>
+            <a:headEnd/>
+            <a:tailEnd/>
+          </a:ln>
+        </p:spPr>
+      </p:pic>
+    </p:spTree>
+  </p:cSld>
+  <p:clrMapOvr>
+    <a:masterClrMapping/>
+  </p:clrMapOvr>
+  <p:timing>
+    <p:tnLst>
+      <p:par>
+        <p:cTn id="1" dur="indefinite" restart="never" nodeType="tmRoot"/>
+      </p:par>
+    </p:tnLst>
+  </p:timing>
+</p:sld>
+</file>
+
+<file path=ppt/slides/slide15.xml><?xml version="1.0" encoding="utf-8"?>
+<p:sld xmlns:a="http://schemas.openxmlformats.org/drawingml/2006/main" xmlns:r="http://schemas.openxmlformats.org/officeDocument/2006/relationships" xmlns:p="http://schemas.openxmlformats.org/presentationml/2006/main">
+  <p:cSld>
+    <p:spTree>
+      <p:nvGrpSpPr>
+        <p:cNvPr id="1" name=""/>
+        <p:cNvGrpSpPr/>
+        <p:nvPr/>
+      </p:nvGrpSpPr>
+      <p:grpSpPr>
+        <a:xfrm>
+          <a:off x="0" y="0"/>
+          <a:ext cx="0" cy="0"/>
+          <a:chOff x="0" y="0"/>
+          <a:chExt cx="0" cy="0"/>
+        </a:xfrm>
+      </p:grpSpPr>
+      <p:pic>
+        <p:nvPicPr>
+          <p:cNvPr id="1026" name="Picture 2"/>
+          <p:cNvPicPr>
+            <a:picLocks noChangeAspect="1" noChangeArrowheads="1"/>
+          </p:cNvPicPr>
+          <p:nvPr/>
+        </p:nvPicPr>
+        <p:blipFill>
+          <a:blip r:embed="rId2" cstate="print"/>
+          <a:srcRect/>
+          <a:stretch>
+            <a:fillRect/>
+          </a:stretch>
+        </p:blipFill>
+        <p:spPr bwMode="auto">
+          <a:xfrm>
+            <a:off x="0" y="0"/>
+            <a:ext cx="9144000" cy="6923674"/>
+          </a:xfrm>
+          <a:prstGeom prst="rect">
+            <a:avLst/>
+          </a:prstGeom>
+          <a:noFill/>
+          <a:ln w="9525">
+            <a:noFill/>
+            <a:miter lim="800000"/>
+            <a:headEnd/>
+            <a:tailEnd/>
+          </a:ln>
+        </p:spPr>
+      </p:pic>
+    </p:spTree>
+  </p:cSld>
+  <p:clrMapOvr>
+    <a:masterClrMapping/>
+  </p:clrMapOvr>
+  <p:timing>
+    <p:tnLst>
+      <p:par>
+        <p:cTn id="1" dur="indefinite" restart="never" nodeType="tmRoot"/>
+      </p:par>
+    </p:tnLst>
+  </p:timing>
+</p:sld>
+</file>
+
+<file path=ppt/slides/slide16.xml><?xml version="1.0" encoding="utf-8"?>
 <p:sld xmlns:a="http://schemas.openxmlformats.org/drawingml/2006/main" xmlns:r="http://schemas.openxmlformats.org/officeDocument/2006/relationships" xmlns:p="http://schemas.openxmlformats.org/presentationml/2006/main" showMasterPhAnim="0">
   <p:cSld>
     <p:spTree>
@@ -16025,7 +16204,7 @@
 </p:sld>
 </file>
 
-<file path=ppt/slides/slide14.xml><?xml version="1.0" encoding="utf-8"?>
+<file path=ppt/slides/slide17.xml><?xml version="1.0" encoding="utf-8"?>
 <p:sld xmlns:a="http://schemas.openxmlformats.org/drawingml/2006/main" xmlns:r="http://schemas.openxmlformats.org/officeDocument/2006/relationships" xmlns:p="http://schemas.openxmlformats.org/presentationml/2006/main" showMasterPhAnim="0">
   <p:cSld>
     <p:spTree>
@@ -19215,7 +19394,7 @@
 </p:sld>
 </file>
 
-<file path=ppt/slides/slide15.xml><?xml version="1.0" encoding="utf-8"?>
+<file path=ppt/slides/slide18.xml><?xml version="1.0" encoding="utf-8"?>
 <p:sld xmlns:a="http://schemas.openxmlformats.org/drawingml/2006/main" xmlns:r="http://schemas.openxmlformats.org/officeDocument/2006/relationships" xmlns:p="http://schemas.openxmlformats.org/presentationml/2006/main">
   <p:cSld>
     <p:spTree>
@@ -20889,7 +21068,7 @@
 </p:sld>
 </file>
 
-<file path=ppt/slides/slide16.xml><?xml version="1.0" encoding="utf-8"?>
+<file path=ppt/slides/slide19.xml><?xml version="1.0" encoding="utf-8"?>
 <p:sld xmlns:a="http://schemas.openxmlformats.org/drawingml/2006/main" xmlns:r="http://schemas.openxmlformats.org/officeDocument/2006/relationships" xmlns:p="http://schemas.openxmlformats.org/presentationml/2006/main">
   <p:cSld>
     <p:spTree>
@@ -22755,7 +22934,7 @@
           <a:graphicData uri="http://schemas.openxmlformats.org/drawingml/2006/table">
             <a:tbl>
               <a:tblPr firstRow="1" bandRow="1">
-                <a:tableStyleId>{69012ECD-51FC-41F1-AA8D-1B2483CD663E}</a:tableStyleId>
+                <a:tableStyleId>{912C8C85-51F0-491E-9774-3900AFEF0FD7}</a:tableStyleId>
               </a:tblPr>
               <a:tblGrid>
                 <a:gridCol w="1475326"/>
@@ -22775,7 +22954,11 @@
                       <a:endParaRPr lang="vi-VN"/>
                     </a:p>
                   </a:txBody>
-                  <a:tcPr/>
+                  <a:tcPr>
+                    <a:solidFill>
+                      <a:srgbClr val="0070C0"/>
+                    </a:solidFill>
+                  </a:tcPr>
                 </a:tc>
                 <a:tc>
                   <a:txBody>
@@ -22793,7 +22976,11 @@
                       <a:endParaRPr lang="vi-VN"/>
                     </a:p>
                   </a:txBody>
-                  <a:tcPr/>
+                  <a:tcPr>
+                    <a:solidFill>
+                      <a:srgbClr val="0070C0"/>
+                    </a:solidFill>
+                  </a:tcPr>
                 </a:tc>
                 <a:tc>
                   <a:txBody>
@@ -22807,7 +22994,11 @@
                       <a:endParaRPr lang="vi-VN"/>
                     </a:p>
                   </a:txBody>
-                  <a:tcPr/>
+                  <a:tcPr>
+                    <a:solidFill>
+                      <a:srgbClr val="0070C0"/>
+                    </a:solidFill>
+                  </a:tcPr>
                 </a:tc>
               </a:tr>
               <a:tr h="431800">
@@ -22845,9 +23036,7 @@
                     <a:lstStyle/>
                     <a:p>
                       <a:r>
-                        <a:rPr lang="en-US" sz="1800" u="sng" kern="1200" smtClean="0">
-                          <a:hlinkClick r:id="rId3"/>
-                        </a:rPr>
+                        <a:rPr lang="en-US" sz="1800" u="sng" kern="1200" smtClean="0"/>
                         <a:t>thuan178@gmail.com</a:t>
                       </a:r>
                       <a:endParaRPr lang="vi-VN">
@@ -22918,9 +23107,7 @@
                         <a:defRPr/>
                       </a:pPr>
                       <a:r>
-                        <a:rPr lang="en-US" sz="1800" u="sng" kern="1200" smtClean="0">
-                          <a:hlinkClick r:id="rId4"/>
-                        </a:rPr>
+                        <a:rPr lang="en-US" sz="1800" u="sng" kern="1200" smtClean="0"/>
                         <a:t>0812508@gmail.com</a:t>
                       </a:r>
                       <a:endParaRPr lang="vi-VN">
@@ -22987,9 +23174,7 @@
                         <a:defRPr/>
                       </a:pPr>
                       <a:r>
-                        <a:rPr lang="en-US" sz="1800" u="sng" kern="1200" smtClean="0">
-                          <a:hlinkClick r:id="rId5"/>
-                        </a:rPr>
+                        <a:rPr lang="en-US" sz="1800" u="sng" kern="1200" smtClean="0"/>
                         <a:t>tienvx2008gs@gmail.com</a:t>
                       </a:r>
                       <a:endParaRPr lang="vi-VN">
@@ -23060,12 +23245,10 @@
                         <a:defRPr/>
                       </a:pPr>
                       <a:r>
-                        <a:rPr lang="vi-VN" sz="1800" kern="1200" smtClean="0">
-                          <a:hlinkClick r:id="rId6"/>
-                        </a:rPr>
+                        <a:rPr lang="vi-VN" sz="1800" u="sng" kern="1200" smtClean="0"/>
                         <a:t>7hanatos13@gmail.com</a:t>
                       </a:r>
-                      <a:endParaRPr lang="vi-VN" sz="1800" kern="1200">
+                      <a:endParaRPr lang="vi-VN" sz="1800" u="sng" kern="1200">
                         <a:solidFill>
                           <a:schemeClr val="accent1">
                             <a:lumMod val="75000"/>
@@ -23136,12 +23319,10 @@
                         <a:defRPr/>
                       </a:pPr>
                       <a:r>
-                        <a:rPr lang="vi-VN" smtClean="0">
-                          <a:hlinkClick r:id="rId7"/>
-                        </a:rPr>
+                        <a:rPr lang="vi-VN" u="sng" smtClean="0"/>
                         <a:t>toai104040005@tiengiang.edu.vn</a:t>
                       </a:r>
-                      <a:endParaRPr lang="vi-VN">
+                      <a:endParaRPr lang="vi-VN" u="sng">
                         <a:solidFill>
                           <a:schemeClr val="accent1">
                             <a:lumMod val="75000"/>

</xml_diff>

<commit_message>
Chỉnh sửa slide và kế hoạch trình bày.
</commit_message>
<xml_diff>
--- a/PA4/4. Slide/WARM.pptx
+++ b/PA4/4. Slide/WARM.pptx
@@ -24,8 +24,8 @@
     <p:sldId id="299" r:id="rId12"/>
     <p:sldId id="300" r:id="rId13"/>
     <p:sldId id="301" r:id="rId14"/>
-    <p:sldId id="302" r:id="rId15"/>
-    <p:sldId id="303" r:id="rId16"/>
+    <p:sldId id="303" r:id="rId15"/>
+    <p:sldId id="302" r:id="rId16"/>
     <p:sldId id="291" r:id="rId17"/>
     <p:sldId id="287" r:id="rId18"/>
     <p:sldId id="276" r:id="rId19"/>
@@ -178,10 +178,10 @@
           <c:layoutTarget val="inner"/>
           <c:xMode val="edge"/>
           <c:yMode val="edge"/>
-          <c:x val="7.2388831437435602E-2"/>
+          <c:x val="7.238883143743563E-2"/>
           <c:y val="0.16610169491525423"/>
           <c:w val="0.85729058945191317"/>
-          <c:h val="0.66949152542373014"/>
+          <c:h val="0.66949152542373025"/>
         </c:manualLayout>
       </c:layout>
       <c:pie3DChart>
@@ -341,7 +341,7 @@
               <c:idx val="3"/>
               <c:layout>
                 <c:manualLayout>
-                  <c:x val="4.9430272538912606E-2"/>
+                  <c:x val="4.9430272538912627E-2"/>
                   <c:y val="8.8076831305177766E-2"/>
                 </c:manualLayout>
               </c:layout>
@@ -365,7 +365,7 @@
               <c:layout>
                 <c:manualLayout>
                   <c:x val="-0.17960033264157374"/>
-                  <c:y val="6.2378429968981339E-2"/>
+                  <c:y val="6.2378429968981353E-2"/>
                 </c:manualLayout>
               </c:layout>
               <c:tx>
@@ -1395,12 +1395,280 @@
           <a:lstStyle/>
           <a:p>
             <a:r>
-              <a:rPr lang="en-US" smtClean="0"/>
-              <a:t>Giới</a:t>
+              <a:rPr lang="en-US" baseline="0" smtClean="0"/>
+              <a:t>Cần nêu ra các nguyên tắc chủ yếu như:</a:t>
+            </a:r>
+          </a:p>
+          <a:p>
+            <a:pPr lvl="1">
+              <a:buFont typeface="Wingdings" pitchFamily="2" charset="2"/>
+              <a:buChar char="v"/>
+            </a:pPr>
+            <a:r>
+              <a:rPr lang="en-US" baseline="0" smtClean="0"/>
+              <a:t> Simple diaglog: hộp thoại thông báo đặt món đơn giản.</a:t>
+            </a:r>
+          </a:p>
+          <a:p>
+            <a:pPr lvl="1">
+              <a:buFont typeface="Wingdings" pitchFamily="2" charset="2"/>
+              <a:buChar char="v"/>
+            </a:pPr>
+            <a:r>
+              <a:rPr lang="en-US" baseline="0" smtClean="0"/>
+              <a:t> Speak user language: quá trình đặt món nhanh chóng.</a:t>
+            </a:r>
+          </a:p>
+          <a:p>
+            <a:pPr lvl="1">
+              <a:buFont typeface="Wingdings" pitchFamily="2" charset="2"/>
+              <a:buChar char="v"/>
+            </a:pPr>
+            <a:r>
+              <a:rPr lang="en-US" sz="1200" kern="1200" smtClean="0">
+                <a:solidFill>
+                  <a:schemeClr val="tx1"/>
+                </a:solidFill>
+                <a:latin typeface="Arial" charset="0"/>
+                <a:ea typeface="+mn-ea"/>
+                <a:cs typeface="+mn-cs"/>
+              </a:rPr>
+              <a:t> Minimize the users' memory load: nhắc</a:t>
             </a:r>
             <a:r>
-              <a:rPr lang="en-US" baseline="0" smtClean="0"/>
-              <a:t> thiệu một số đặc điểm nổi bật của trang web so với các trang web tương tự.</a:t>
+              <a:rPr lang="en-US" sz="1200" kern="1200" baseline="0" smtClean="0">
+                <a:solidFill>
+                  <a:schemeClr val="tx1"/>
+                </a:solidFill>
+                <a:latin typeface="Arial" charset="0"/>
+                <a:ea typeface="+mn-ea"/>
+                <a:cs typeface="+mn-cs"/>
+              </a:rPr>
+              <a:t> tên món cho người dùng khi tìm kiếm.</a:t>
+            </a:r>
+          </a:p>
+          <a:p>
+            <a:pPr marL="457200" marR="0" lvl="1" indent="0" algn="l" defTabSz="914400" rtl="0" eaLnBrk="1" fontAlgn="base" latinLnBrk="0" hangingPunct="1">
+              <a:lnSpc>
+                <a:spcPct val="100000"/>
+              </a:lnSpc>
+              <a:spcBef>
+                <a:spcPct val="30000"/>
+              </a:spcBef>
+              <a:spcAft>
+                <a:spcPct val="0"/>
+              </a:spcAft>
+              <a:buClrTx/>
+              <a:buSzTx/>
+              <a:buFont typeface="Wingdings" pitchFamily="2" charset="2"/>
+              <a:buChar char="v"/>
+              <a:tabLst/>
+              <a:defRPr/>
+            </a:pPr>
+            <a:r>
+              <a:rPr lang="en-US" sz="1200" kern="1200" smtClean="0">
+                <a:solidFill>
+                  <a:schemeClr val="tx1"/>
+                </a:solidFill>
+                <a:latin typeface="Arial" charset="0"/>
+                <a:ea typeface="+mn-ea"/>
+                <a:cs typeface="+mn-cs"/>
+              </a:rPr>
+              <a:t> Consistency:</a:t>
+            </a:r>
+            <a:r>
+              <a:rPr lang="en-US" sz="1200" kern="1200" baseline="0" smtClean="0">
+                <a:solidFill>
+                  <a:schemeClr val="tx1"/>
+                </a:solidFill>
+                <a:latin typeface="Arial" charset="0"/>
+                <a:ea typeface="+mn-ea"/>
+                <a:cs typeface="+mn-cs"/>
+              </a:rPr>
+              <a:t> giao diện thống nhất ở các button và textbox.</a:t>
+            </a:r>
+          </a:p>
+          <a:p>
+            <a:pPr marL="457200" marR="0" lvl="1" indent="0" algn="l" defTabSz="914400" rtl="0" eaLnBrk="1" fontAlgn="base" latinLnBrk="0" hangingPunct="1">
+              <a:lnSpc>
+                <a:spcPct val="100000"/>
+              </a:lnSpc>
+              <a:spcBef>
+                <a:spcPct val="30000"/>
+              </a:spcBef>
+              <a:spcAft>
+                <a:spcPct val="0"/>
+              </a:spcAft>
+              <a:buClrTx/>
+              <a:buSzTx/>
+              <a:buFont typeface="Wingdings" pitchFamily="2" charset="2"/>
+              <a:buChar char="v"/>
+              <a:tabLst/>
+              <a:defRPr/>
+            </a:pPr>
+            <a:r>
+              <a:rPr lang="en-US" sz="1200" kern="1200" smtClean="0">
+                <a:solidFill>
+                  <a:schemeClr val="tx1"/>
+                </a:solidFill>
+                <a:latin typeface="Arial" charset="0"/>
+                <a:ea typeface="+mn-ea"/>
+                <a:cs typeface="+mn-cs"/>
+              </a:rPr>
+              <a:t> Feedback: phản</a:t>
+            </a:r>
+            <a:r>
+              <a:rPr lang="en-US" sz="1200" kern="1200" baseline="0" smtClean="0">
+                <a:solidFill>
+                  <a:schemeClr val="tx1"/>
+                </a:solidFill>
+                <a:latin typeface="Arial" charset="0"/>
+                <a:ea typeface="+mn-ea"/>
+                <a:cs typeface="+mn-cs"/>
+              </a:rPr>
+              <a:t> hồi khi người dùng chọn chức năng hay thông báo khi đặt món thành công.</a:t>
+            </a:r>
+            <a:endParaRPr lang="en-US" baseline="0" smtClean="0"/>
+          </a:p>
+          <a:p>
+            <a:pPr lvl="1">
+              <a:buFont typeface="Wingdings" pitchFamily="2" charset="2"/>
+              <a:buChar char="v"/>
+            </a:pPr>
+            <a:r>
+              <a:rPr lang="en-US" sz="1200" kern="1200" smtClean="0">
+                <a:solidFill>
+                  <a:schemeClr val="tx1"/>
+                </a:solidFill>
+                <a:latin typeface="Arial" charset="0"/>
+                <a:ea typeface="+mn-ea"/>
+                <a:cs typeface="+mn-cs"/>
+              </a:rPr>
+              <a:t> Clearly marked exits:</a:t>
+            </a:r>
+            <a:r>
+              <a:rPr lang="en-US" sz="1200" kern="1200" baseline="0" smtClean="0">
+                <a:solidFill>
+                  <a:schemeClr val="tx1"/>
+                </a:solidFill>
+                <a:latin typeface="Arial" charset="0"/>
+                <a:ea typeface="+mn-ea"/>
+                <a:cs typeface="+mn-cs"/>
+              </a:rPr>
+              <a:t> không có.</a:t>
+            </a:r>
+          </a:p>
+          <a:p>
+            <a:pPr lvl="1">
+              <a:buFont typeface="Wingdings" pitchFamily="2" charset="2"/>
+              <a:buChar char="v"/>
+            </a:pPr>
+            <a:r>
+              <a:rPr lang="en-US" sz="1200" kern="1200" smtClean="0">
+                <a:solidFill>
+                  <a:schemeClr val="tx1"/>
+                </a:solidFill>
+                <a:latin typeface="Arial" charset="0"/>
+                <a:ea typeface="+mn-ea"/>
+                <a:cs typeface="+mn-cs"/>
+              </a:rPr>
+              <a:t> Shortcuts: các</a:t>
+            </a:r>
+            <a:r>
+              <a:rPr lang="en-US" sz="1200" kern="1200" baseline="0" smtClean="0">
+                <a:solidFill>
+                  <a:schemeClr val="tx1"/>
+                </a:solidFill>
+                <a:latin typeface="Arial" charset="0"/>
+                <a:ea typeface="+mn-ea"/>
+                <a:cs typeface="+mn-cs"/>
+              </a:rPr>
+              <a:t> thanh định hướng giúp dễ dàng thao tác.</a:t>
+            </a:r>
+            <a:endParaRPr lang="en-US" smtClean="0"/>
+          </a:p>
+          <a:p>
+            <a:pPr lvl="1">
+              <a:buFont typeface="Wingdings" pitchFamily="2" charset="2"/>
+              <a:buChar char="v"/>
+            </a:pPr>
+            <a:r>
+              <a:rPr lang="en-US" sz="1200" kern="1200" smtClean="0">
+                <a:solidFill>
+                  <a:schemeClr val="tx1"/>
+                </a:solidFill>
+                <a:latin typeface="Arial" charset="0"/>
+                <a:ea typeface="+mn-ea"/>
+                <a:cs typeface="+mn-cs"/>
+              </a:rPr>
+              <a:t> Good error messages: không</a:t>
+            </a:r>
+            <a:r>
+              <a:rPr lang="en-US" sz="1200" kern="1200" baseline="0" smtClean="0">
+                <a:solidFill>
+                  <a:schemeClr val="tx1"/>
+                </a:solidFill>
+                <a:latin typeface="Arial" charset="0"/>
+                <a:ea typeface="+mn-ea"/>
+                <a:cs typeface="+mn-cs"/>
+              </a:rPr>
+              <a:t> có.</a:t>
+            </a:r>
+          </a:p>
+          <a:p>
+            <a:pPr lvl="1">
+              <a:buFont typeface="Wingdings" pitchFamily="2" charset="2"/>
+              <a:buChar char="v"/>
+            </a:pPr>
+            <a:r>
+              <a:rPr lang="en-US" sz="1200" kern="1200" smtClean="0">
+                <a:solidFill>
+                  <a:schemeClr val="tx1"/>
+                </a:solidFill>
+                <a:latin typeface="Arial" charset="0"/>
+                <a:ea typeface="+mn-ea"/>
+                <a:cs typeface="+mn-cs"/>
+              </a:rPr>
+              <a:t> Prevent errors: dễ</a:t>
+            </a:r>
+            <a:r>
+              <a:rPr lang="en-US" sz="1200" kern="1200" baseline="0" smtClean="0">
+                <a:solidFill>
+                  <a:schemeClr val="tx1"/>
+                </a:solidFill>
+                <a:latin typeface="Arial" charset="0"/>
+                <a:ea typeface="+mn-ea"/>
+                <a:cs typeface="+mn-cs"/>
+              </a:rPr>
+              <a:t> dàng xóa món đã chọn ra khỏi phiếu đặt.</a:t>
+            </a:r>
+          </a:p>
+          <a:p>
+            <a:pPr lvl="1">
+              <a:buFont typeface="Wingdings" pitchFamily="2" charset="2"/>
+              <a:buChar char="v"/>
+            </a:pPr>
+            <a:r>
+              <a:rPr lang="fr-FR" sz="1200" kern="1200" smtClean="0">
+                <a:solidFill>
+                  <a:schemeClr val="tx1"/>
+                </a:solidFill>
+                <a:latin typeface="Arial" charset="0"/>
+                <a:ea typeface="+mn-ea"/>
+                <a:cs typeface="+mn-cs"/>
+              </a:rPr>
+              <a:t> Help and documentation: không</a:t>
+            </a:r>
+            <a:r>
+              <a:rPr lang="fr-FR" sz="1200" kern="1200" baseline="0" smtClean="0">
+                <a:solidFill>
+                  <a:schemeClr val="tx1"/>
+                </a:solidFill>
+                <a:latin typeface="Arial" charset="0"/>
+                <a:ea typeface="+mn-ea"/>
+                <a:cs typeface="+mn-cs"/>
+              </a:rPr>
+              <a:t> có.</a:t>
             </a:r>
             <a:endParaRPr lang="vi-VN"/>
           </a:p>
@@ -1672,7 +1940,11 @@
             </a:pPr>
             <a:r>
               <a:rPr lang="en-US" baseline="0" smtClean="0"/>
-              <a:t>Rất ích nhà hàng ở Việt Nam có trang web.</a:t>
+              <a:t> Rất </a:t>
+            </a:r>
+            <a:r>
+              <a:rPr lang="en-US" baseline="0" smtClean="0"/>
+              <a:t>ích nhà hàng ở Việt Nam có trang web.</a:t>
             </a:r>
           </a:p>
           <a:p>
@@ -1682,11 +1954,15 @@
             </a:pPr>
             <a:r>
               <a:rPr lang="en-US" smtClean="0"/>
-              <a:t>Các</a:t>
+              <a:t> Các</a:t>
             </a:r>
             <a:r>
               <a:rPr lang="en-US" baseline="0" smtClean="0"/>
-              <a:t> trang web của các nhà hàng hàng đầu thế giới cũng không thật sự nổi bật.</a:t>
+              <a:t> </a:t>
+            </a:r>
+            <a:r>
+              <a:rPr lang="en-US" baseline="0" smtClean="0"/>
+              <a:t>trang web của các nhà hàng hàng đầu thế giới cũng không thật sự nổi bật.</a:t>
             </a:r>
           </a:p>
           <a:p>
@@ -1696,7 +1972,11 @@
             </a:pPr>
             <a:r>
               <a:rPr lang="en-US" baseline="0" smtClean="0"/>
-              <a:t>Khi muốn đặt món phải gọi điện trực tiếp (tốn thời gian), hoặc đến tận nhà hàng để coi thực đơn (càng tốn thời gian).</a:t>
+              <a:t> Khi </a:t>
+            </a:r>
+            <a:r>
+              <a:rPr lang="en-US" baseline="0" smtClean="0"/>
+              <a:t>muốn đặt món phải gọi điện trực tiếp (tốn thời gian), hoặc đến tận nhà hàng để coi thực đơn (càng tốn thời gian).</a:t>
             </a:r>
             <a:endParaRPr lang="vi-VN"/>
           </a:p>
@@ -1780,6 +2060,26 @@
           </a:bodyPr>
           <a:lstStyle/>
           <a:p>
+            <a:r>
+              <a:rPr lang="en-US" smtClean="0"/>
+              <a:t>Các</a:t>
+            </a:r>
+            <a:r>
+              <a:rPr lang="en-US" baseline="0" smtClean="0"/>
+              <a:t> yêu cầu phân chia theo 3 phân hệ.</a:t>
+            </a:r>
+          </a:p>
+          <a:p>
+            <a:r>
+              <a:rPr lang="en-US" baseline="0" smtClean="0"/>
+              <a:t>Phân hệ bên phải sẽ bao gồm luôn các chức năng của phân hệ bên trái.</a:t>
+            </a:r>
+          </a:p>
+          <a:p>
+            <a:r>
+              <a:rPr lang="en-US" baseline="0" smtClean="0"/>
+              <a:t>Các chức năng quản lý bao gồm luôn việc thêm-xóa-cập nhật.</a:t>
+            </a:r>
             <a:endParaRPr lang="vi-VN"/>
           </a:p>
         </p:txBody>
@@ -1878,8 +2178,17 @@
             </a:pPr>
             <a:r>
               <a:rPr lang="en-US" baseline="0" smtClean="0"/>
-              <a:t>Người có dùng internet, không cần thường xuyên, ít nhất 1 tháng 1 lần.</a:t>
+              <a:t> Người </a:t>
             </a:r>
+            <a:r>
+              <a:rPr lang="en-US" baseline="0" smtClean="0"/>
+              <a:t>có dùng internet, không cần thường xuyên, ít nhất 1 tháng 1 </a:t>
+            </a:r>
+            <a:r>
+              <a:rPr lang="en-US" baseline="0" smtClean="0"/>
+              <a:t>lần, không cần hiểu biết sâu về tin học.</a:t>
+            </a:r>
+            <a:endParaRPr lang="en-US" baseline="0" smtClean="0"/>
           </a:p>
           <a:p>
             <a:pPr lvl="1">
@@ -1888,7 +2197,11 @@
             </a:pPr>
             <a:r>
               <a:rPr lang="en-US" baseline="0" smtClean="0"/>
-              <a:t>Người có độ tuổi trên 16 tuổi.</a:t>
+              <a:t> Người </a:t>
+            </a:r>
+            <a:r>
+              <a:rPr lang="en-US" baseline="0" smtClean="0"/>
+              <a:t>có độ tuổi trên 16 tuổi.</a:t>
             </a:r>
           </a:p>
           <a:p>
@@ -1898,7 +2211,11 @@
             </a:pPr>
             <a:r>
               <a:rPr lang="en-US" baseline="0" smtClean="0"/>
-              <a:t>Đối tượng là công chức, sinh viên, doanh nhân.</a:t>
+              <a:t> Đối </a:t>
+            </a:r>
+            <a:r>
+              <a:rPr lang="en-US" baseline="0" smtClean="0"/>
+              <a:t>tượng là công chức, sinh viên, doanh nhân.</a:t>
             </a:r>
             <a:endParaRPr lang="vi-VN"/>
           </a:p>
@@ -2028,8 +2345,38 @@
                 <a:ea typeface="+mn-ea"/>
                 <a:cs typeface="+mn-cs"/>
               </a:rPr>
-              <a:t>Chạy thẳng đến nhà hàng và đặt món.</a:t>
+              <a:t> Chạy </a:t>
             </a:r>
+            <a:r>
+              <a:rPr lang="vi-VN" sz="1200" kern="1200" smtClean="0">
+                <a:solidFill>
+                  <a:schemeClr val="tx1"/>
+                </a:solidFill>
+                <a:latin typeface="Arial" charset="0"/>
+                <a:ea typeface="+mn-ea"/>
+                <a:cs typeface="+mn-cs"/>
+              </a:rPr>
+              <a:t>thẳng đến nhà hàng và đặt món</a:t>
+            </a:r>
+            <a:r>
+              <a:rPr lang="vi-VN" sz="1200" kern="1200" smtClean="0">
+                <a:solidFill>
+                  <a:schemeClr val="tx1"/>
+                </a:solidFill>
+                <a:latin typeface="Arial" charset="0"/>
+                <a:ea typeface="+mn-ea"/>
+                <a:cs typeface="+mn-cs"/>
+              </a:rPr>
+              <a:t>.</a:t>
+            </a:r>
+            <a:endParaRPr lang="vi-VN" sz="1200" kern="1200" smtClean="0">
+              <a:solidFill>
+                <a:schemeClr val="tx1"/>
+              </a:solidFill>
+              <a:latin typeface="Arial" charset="0"/>
+              <a:ea typeface="+mn-ea"/>
+              <a:cs typeface="+mn-cs"/>
+            </a:endParaRPr>
           </a:p>
           <a:p>
             <a:pPr lvl="1">
@@ -2045,7 +2392,18 @@
                 <a:ea typeface="+mn-ea"/>
                 <a:cs typeface="+mn-cs"/>
               </a:rPr>
-              <a:t>Gọi điện trực tiếp đến nhà hàng đặt món.</a:t>
+              <a:t> Gọi </a:t>
+            </a:r>
+            <a:r>
+              <a:rPr lang="vi-VN" sz="1200" kern="1200" smtClean="0">
+                <a:solidFill>
+                  <a:schemeClr val="tx1"/>
+                </a:solidFill>
+                <a:latin typeface="Arial" charset="0"/>
+                <a:ea typeface="+mn-ea"/>
+                <a:cs typeface="+mn-cs"/>
+              </a:rPr>
+              <a:t>điện trực tiếp đến nhà hàng đặt món.</a:t>
             </a:r>
           </a:p>
           <a:p>
@@ -2062,7 +2420,18 @@
                 <a:ea typeface="+mn-ea"/>
                 <a:cs typeface="+mn-cs"/>
               </a:rPr>
-              <a:t>Đặt món ăn từ trang web của nhà hàng.</a:t>
+              <a:t> Đặt </a:t>
+            </a:r>
+            <a:r>
+              <a:rPr lang="vi-VN" sz="1200" kern="1200" smtClean="0">
+                <a:solidFill>
+                  <a:schemeClr val="tx1"/>
+                </a:solidFill>
+                <a:latin typeface="Arial" charset="0"/>
+                <a:ea typeface="+mn-ea"/>
+                <a:cs typeface="+mn-cs"/>
+              </a:rPr>
+              <a:t>món ăn từ trang web của nhà hàng.</a:t>
             </a:r>
           </a:p>
           <a:p>
@@ -2079,7 +2448,18 @@
                 <a:ea typeface="+mn-ea"/>
                 <a:cs typeface="+mn-cs"/>
               </a:rPr>
-              <a:t>Khác:________</a:t>
+              <a:t> Khác</a:t>
+            </a:r>
+            <a:r>
+              <a:rPr lang="en-US" sz="1200" kern="1200" smtClean="0">
+                <a:solidFill>
+                  <a:schemeClr val="tx1"/>
+                </a:solidFill>
+                <a:latin typeface="Arial" charset="0"/>
+                <a:ea typeface="+mn-ea"/>
+                <a:cs typeface="+mn-cs"/>
+              </a:rPr>
+              <a:t>:________</a:t>
             </a:r>
             <a:endParaRPr lang="vi-VN" sz="1200" kern="1200" smtClean="0">
               <a:solidFill>
@@ -2146,7 +2526,18 @@
                 <a:ea typeface="+mn-ea"/>
                 <a:cs typeface="+mn-cs"/>
               </a:rPr>
-              <a:t>Bố cục trình bày dễ hiểu, dễ thao tác.</a:t>
+              <a:t> Bố </a:t>
+            </a:r>
+            <a:r>
+              <a:rPr lang="vi-VN" sz="1200" kern="1200" smtClean="0">
+                <a:solidFill>
+                  <a:schemeClr val="tx1"/>
+                </a:solidFill>
+                <a:latin typeface="Arial" charset="0"/>
+                <a:ea typeface="+mn-ea"/>
+                <a:cs typeface="+mn-cs"/>
+              </a:rPr>
+              <a:t>cục trình bày dễ hiểu, dễ thao tác.</a:t>
             </a:r>
           </a:p>
           <a:p>
@@ -2169,7 +2560,18 @@
                 <a:ea typeface="+mn-ea"/>
                 <a:cs typeface="+mn-cs"/>
               </a:rPr>
-              <a:t>Có nhiều hình ảnh sinh động, đủ màu sắc sặc sở.</a:t>
+              <a:t> Có </a:t>
+            </a:r>
+            <a:r>
+              <a:rPr lang="vi-VN" sz="1200" kern="1200" smtClean="0">
+                <a:solidFill>
+                  <a:schemeClr val="tx1"/>
+                </a:solidFill>
+                <a:latin typeface="Arial" charset="0"/>
+                <a:ea typeface="+mn-ea"/>
+                <a:cs typeface="+mn-cs"/>
+              </a:rPr>
+              <a:t>nhiều hình ảnh sinh động, đủ màu sắc sặc sở.</a:t>
             </a:r>
           </a:p>
           <a:p>
@@ -2192,7 +2594,18 @@
                 <a:ea typeface="+mn-ea"/>
                 <a:cs typeface="+mn-cs"/>
               </a:rPr>
-              <a:t>Nội dung hay, đúng tiêu chí người dùng.</a:t>
+              <a:t> Nội </a:t>
+            </a:r>
+            <a:r>
+              <a:rPr lang="vi-VN" sz="1200" kern="1200" smtClean="0">
+                <a:solidFill>
+                  <a:schemeClr val="tx1"/>
+                </a:solidFill>
+                <a:latin typeface="Arial" charset="0"/>
+                <a:ea typeface="+mn-ea"/>
+                <a:cs typeface="+mn-cs"/>
+              </a:rPr>
+              <a:t>dung hay, đúng tiêu chí người dùng.</a:t>
             </a:r>
           </a:p>
           <a:p>
@@ -2215,7 +2628,18 @@
                 <a:ea typeface="+mn-ea"/>
                 <a:cs typeface="+mn-cs"/>
               </a:rPr>
-              <a:t>Khác:________</a:t>
+              <a:t> Khác</a:t>
+            </a:r>
+            <a:r>
+              <a:rPr lang="en-US" sz="1200" kern="1200" smtClean="0">
+                <a:solidFill>
+                  <a:schemeClr val="tx1"/>
+                </a:solidFill>
+                <a:latin typeface="Arial" charset="0"/>
+                <a:ea typeface="+mn-ea"/>
+                <a:cs typeface="+mn-cs"/>
+              </a:rPr>
+              <a:t>:________</a:t>
             </a:r>
             <a:endParaRPr lang="vi-VN" sz="1200" kern="1200" smtClean="0">
               <a:solidFill>
@@ -2304,7 +2728,18 @@
                 <a:ea typeface="+mn-ea"/>
                 <a:cs typeface="+mn-cs"/>
               </a:rPr>
-              <a:t>Gọi điện thoại để xác nhận việc đặt bàn.</a:t>
+              <a:t> Gọi </a:t>
+            </a:r>
+            <a:r>
+              <a:rPr lang="vi-VN" sz="1200" kern="1200" smtClean="0">
+                <a:solidFill>
+                  <a:schemeClr val="tx1"/>
+                </a:solidFill>
+                <a:latin typeface="Arial" charset="0"/>
+                <a:ea typeface="+mn-ea"/>
+                <a:cs typeface="+mn-cs"/>
+              </a:rPr>
+              <a:t>điện thoại để xác nhận việc đặt bàn.</a:t>
             </a:r>
           </a:p>
           <a:p>
@@ -2327,7 +2762,18 @@
                 <a:ea typeface="+mn-ea"/>
                 <a:cs typeface="+mn-cs"/>
               </a:rPr>
-              <a:t>Phải tạo tài khoản và đăng nhập trước khi đặt bàn.</a:t>
+              <a:t> Phải </a:t>
+            </a:r>
+            <a:r>
+              <a:rPr lang="vi-VN" sz="1200" kern="1200" smtClean="0">
+                <a:solidFill>
+                  <a:schemeClr val="tx1"/>
+                </a:solidFill>
+                <a:latin typeface="Arial" charset="0"/>
+                <a:ea typeface="+mn-ea"/>
+                <a:cs typeface="+mn-cs"/>
+              </a:rPr>
+              <a:t>tạo tài khoản và đăng nhập trước khi đặt bàn.</a:t>
             </a:r>
           </a:p>
           <a:p>
@@ -2350,7 +2796,18 @@
                 <a:ea typeface="+mn-ea"/>
                 <a:cs typeface="+mn-cs"/>
               </a:rPr>
-              <a:t>Tốn thời gian thực hiện nhiều bước để đặt bàn.</a:t>
+              <a:t> Tốn </a:t>
+            </a:r>
+            <a:r>
+              <a:rPr lang="vi-VN" sz="1200" kern="1200" smtClean="0">
+                <a:solidFill>
+                  <a:schemeClr val="tx1"/>
+                </a:solidFill>
+                <a:latin typeface="Arial" charset="0"/>
+                <a:ea typeface="+mn-ea"/>
+                <a:cs typeface="+mn-cs"/>
+              </a:rPr>
+              <a:t>thời gian thực hiện nhiều bước để đặt bàn.</a:t>
             </a:r>
           </a:p>
           <a:p>
@@ -2373,7 +2830,18 @@
                 <a:ea typeface="+mn-ea"/>
                 <a:cs typeface="+mn-cs"/>
               </a:rPr>
-              <a:t>Không hỗ trợ tốt quá trình lựa chọn các món ăn.</a:t>
+              <a:t> Không </a:t>
+            </a:r>
+            <a:r>
+              <a:rPr lang="vi-VN" sz="1200" kern="1200" smtClean="0">
+                <a:solidFill>
+                  <a:schemeClr val="tx1"/>
+                </a:solidFill>
+                <a:latin typeface="Arial" charset="0"/>
+                <a:ea typeface="+mn-ea"/>
+                <a:cs typeface="+mn-cs"/>
+              </a:rPr>
+              <a:t>hỗ trợ tốt quá trình lựa chọn các món ăn.</a:t>
             </a:r>
           </a:p>
           <a:p>
@@ -2396,7 +2864,7 @@
                 <a:ea typeface="+mn-ea"/>
                 <a:cs typeface="+mn-cs"/>
               </a:rPr>
-              <a:t>Khác:________</a:t>
+              <a:t> Khác:________</a:t>
             </a:r>
             <a:endParaRPr lang="vi-VN" sz="1200" kern="1200" smtClean="0">
               <a:solidFill>
@@ -2406,9 +2874,6 @@
               <a:ea typeface="+mn-ea"/>
               <a:cs typeface="+mn-cs"/>
             </a:endParaRPr>
-          </a:p>
-          <a:p>
-            <a:endParaRPr lang="en-US" smtClean="0"/>
           </a:p>
         </p:txBody>
       </p:sp>
@@ -2506,7 +2971,11 @@
             </a:pPr>
             <a:r>
               <a:rPr lang="en-US" baseline="0" smtClean="0"/>
-              <a:t>Quảng cáo trên TV: khoảng một phút, nhiều người biết, tốn nhiều tiền, không đầy đủ thông tin.</a:t>
+              <a:t> Quảng </a:t>
+            </a:r>
+            <a:r>
+              <a:rPr lang="en-US" baseline="0" smtClean="0"/>
+              <a:t>cáo trên TV: khoảng một phút, nhiều người biết, tốn nhiều tiền, không đầy đủ thông tin.</a:t>
             </a:r>
           </a:p>
           <a:p>
@@ -2516,7 +2985,11 @@
             </a:pPr>
             <a:r>
               <a:rPr lang="en-US" baseline="0" smtClean="0"/>
-              <a:t>Treo băng-rôn: chi phí rẻ, ít người biết, không đầy đủ thông tin.</a:t>
+              <a:t> Treo </a:t>
+            </a:r>
+            <a:r>
+              <a:rPr lang="en-US" baseline="0" smtClean="0"/>
+              <a:t>băng-rôn: chi phí rẻ, ít người biết, không đầy đủ thông tin.</a:t>
             </a:r>
           </a:p>
           <a:p>
@@ -2526,7 +2999,11 @@
             </a:pPr>
             <a:r>
               <a:rPr lang="en-US" baseline="0" smtClean="0"/>
-              <a:t>Phát tờ rơi: chi phí tương đối, số lượng người biết tương đối, thông tin cũng ở mức tương đối.</a:t>
+              <a:t> Phát </a:t>
+            </a:r>
+            <a:r>
+              <a:rPr lang="en-US" baseline="0" smtClean="0"/>
+              <a:t>tờ rơi: chi phí tương đối, số lượng người biết tương đối, thông tin cũng ở mức tương đối.</a:t>
             </a:r>
           </a:p>
           <a:p>
@@ -2536,7 +3013,11 @@
             </a:pPr>
             <a:r>
               <a:rPr lang="en-US" baseline="0" smtClean="0"/>
-              <a:t>Làm trang web: chi phí tương đối cao, nhiều người biết nếu có khả năng quảng cáo trang web, lượng thông tin nhiều.</a:t>
+              <a:t> Làm </a:t>
+            </a:r>
+            <a:r>
+              <a:rPr lang="en-US" baseline="0" smtClean="0"/>
+              <a:t>trang web: chi phí tương đối cao, nhiều người biết nếu có khả năng quảng cáo trang web, lượng thông tin nhiều.</a:t>
             </a:r>
             <a:endParaRPr lang="vi-VN"/>
           </a:p>
@@ -10512,7 +10993,15 @@
                   <a:srgbClr val="080808"/>
                 </a:solidFill>
               </a:rPr>
-              <a:t>Kiến trúc từng tầng</a:t>
+              <a:t>Kiến trúc từng </a:t>
+            </a:r>
+            <a:r>
+              <a:rPr lang="en-US" sz="2000" smtClean="0">
+                <a:solidFill>
+                  <a:srgbClr val="080808"/>
+                </a:solidFill>
+              </a:rPr>
+              <a:t>tầng dạng 2D/3D</a:t>
             </a:r>
             <a:endParaRPr lang="en-US" sz="2000">
               <a:solidFill>
@@ -10889,8 +11378,21 @@
                   <a:srgbClr val="080808"/>
                 </a:solidFill>
               </a:rPr>
-              <a:t>Nhập từ khóa tìm kiếm.</a:t>
+              <a:t>Nhập từ khóa tìm </a:t>
             </a:r>
+            <a:r>
+              <a:rPr lang="en-US" sz="2000" smtClean="0">
+                <a:solidFill>
+                  <a:srgbClr val="080808"/>
+                </a:solidFill>
+              </a:rPr>
+              <a:t>kiếm</a:t>
+            </a:r>
+            <a:endParaRPr lang="en-US" sz="2000" smtClean="0">
+              <a:solidFill>
+                <a:srgbClr val="080808"/>
+              </a:solidFill>
+            </a:endParaRPr>
           </a:p>
           <a:p>
             <a:pPr marL="171450" indent="-171450"/>
@@ -10900,7 +11402,31 @@
                   <a:srgbClr val="080808"/>
                 </a:solidFill>
               </a:rPr>
-              <a:t>Xem chi tiết kế quả tìm kiếm.</a:t>
+              <a:t>Xem chi tiết </a:t>
+            </a:r>
+            <a:r>
+              <a:rPr lang="en-US" sz="2000" smtClean="0">
+                <a:solidFill>
+                  <a:srgbClr val="080808"/>
+                </a:solidFill>
+              </a:rPr>
+              <a:t>kết </a:t>
+            </a:r>
+            <a:r>
+              <a:rPr lang="en-US" sz="2000" smtClean="0">
+                <a:solidFill>
+                  <a:srgbClr val="080808"/>
+                </a:solidFill>
+              </a:rPr>
+              <a:t>quả tìm </a:t>
+            </a:r>
+            <a:r>
+              <a:rPr lang="en-US" sz="2000" smtClean="0">
+                <a:solidFill>
+                  <a:srgbClr val="080808"/>
+                </a:solidFill>
+              </a:rPr>
+              <a:t>kiếm</a:t>
             </a:r>
             <a:endParaRPr lang="en-US" sz="2000">
               <a:solidFill>
@@ -10948,7 +11474,15 @@
                   <a:srgbClr val="080808"/>
                 </a:solidFill>
               </a:rPr>
-              <a:t>Xem danh sách món theo danh mục</a:t>
+              <a:t>Đặt </a:t>
+            </a:r>
+            <a:r>
+              <a:rPr lang="en-US" sz="2000" smtClean="0">
+                <a:solidFill>
+                  <a:srgbClr val="080808"/>
+                </a:solidFill>
+              </a:rPr>
+              <a:t>món</a:t>
             </a:r>
           </a:p>
           <a:p>
@@ -10959,7 +11493,15 @@
                   <a:srgbClr val="080808"/>
                 </a:solidFill>
               </a:rPr>
-              <a:t>Đặt món</a:t>
+              <a:t>Đặt </a:t>
+            </a:r>
+            <a:r>
+              <a:rPr lang="en-US" sz="2000" smtClean="0">
+                <a:solidFill>
+                  <a:srgbClr val="080808"/>
+                </a:solidFill>
+              </a:rPr>
+              <a:t>bàn</a:t>
             </a:r>
           </a:p>
           <a:p>
@@ -10970,7 +11512,7 @@
                   <a:srgbClr val="080808"/>
                 </a:solidFill>
               </a:rPr>
-              <a:t>Đặt bàn</a:t>
+              <a:t>Đăng nhập/đăng ký</a:t>
             </a:r>
             <a:endParaRPr lang="en-US" sz="2000">
               <a:solidFill>
@@ -13043,8 +13585,10 @@
       </p:grpSpPr>
       <p:pic>
         <p:nvPicPr>
-          <p:cNvPr id="3" name="Picture 2"/>
-          <p:cNvPicPr/>
+          <p:cNvPr id="1026" name="Picture 2"/>
+          <p:cNvPicPr>
+            <a:picLocks noChangeAspect="1" noChangeArrowheads="1"/>
+          </p:cNvPicPr>
           <p:nvPr/>
         </p:nvPicPr>
         <p:blipFill>
@@ -13057,7 +13601,7 @@
         <p:spPr bwMode="auto">
           <a:xfrm>
             <a:off x="0" y="0"/>
-            <a:ext cx="9144000" cy="6858000"/>
+            <a:ext cx="9144000" cy="6923674"/>
           </a:xfrm>
           <a:prstGeom prst="rect">
             <a:avLst/>
@@ -13105,10 +13649,8 @@
       </p:grpSpPr>
       <p:pic>
         <p:nvPicPr>
-          <p:cNvPr id="1026" name="Picture 2"/>
-          <p:cNvPicPr>
-            <a:picLocks noChangeAspect="1" noChangeArrowheads="1"/>
-          </p:cNvPicPr>
+          <p:cNvPr id="3" name="Picture 2"/>
+          <p:cNvPicPr/>
           <p:nvPr/>
         </p:nvPicPr>
         <p:blipFill>
@@ -13121,7 +13663,7 @@
         <p:spPr bwMode="auto">
           <a:xfrm>
             <a:off x="0" y="0"/>
-            <a:ext cx="9144000" cy="6923674"/>
+            <a:ext cx="9144000" cy="6858000"/>
           </a:xfrm>
           <a:prstGeom prst="rect">
             <a:avLst/>
@@ -17431,8 +17973,21 @@
                   <a:srgbClr val="FFFFFF"/>
                 </a:solidFill>
               </a:rPr>
-              <a:t>Đăng nhập.</a:t>
+              <a:t>Đăng </a:t>
             </a:r>
+            <a:r>
+              <a:rPr lang="en-US" sz="1400" smtClean="0">
+                <a:solidFill>
+                  <a:srgbClr val="FFFFFF"/>
+                </a:solidFill>
+              </a:rPr>
+              <a:t>nhập</a:t>
+            </a:r>
+            <a:endParaRPr lang="en-US" sz="1400" smtClean="0">
+              <a:solidFill>
+                <a:srgbClr val="FFFFFF"/>
+              </a:solidFill>
+            </a:endParaRPr>
           </a:p>
           <a:p>
             <a:pPr marL="120650" indent="-120650">
@@ -17451,7 +18006,15 @@
                   <a:srgbClr val="FFFFFF"/>
                 </a:solidFill>
               </a:rPr>
-              <a:t>Đăng ký.</a:t>
+              <a:t>Đăng </a:t>
+            </a:r>
+            <a:r>
+              <a:rPr lang="en-US" sz="1400" smtClean="0">
+                <a:solidFill>
+                  <a:srgbClr val="FFFFFF"/>
+                </a:solidFill>
+              </a:rPr>
+              <a:t>ký</a:t>
             </a:r>
             <a:endParaRPr lang="en-US" sz="1400">
               <a:solidFill>
@@ -21178,6 +21741,32 @@
           </a:p>
         </p:txBody>
       </p:sp>
+      <p:pic>
+        <p:nvPicPr>
+          <p:cNvPr id="5" name="Picture 10" descr="http://t3.gstatic.com/images?q=tbn:ANd9GcTSKPIzSb6YjdrnFmFez-IP1WLpEXKujuqMDDkJjhlYWeI85aVd"/>
+          <p:cNvPicPr>
+            <a:picLocks noChangeAspect="1" noChangeArrowheads="1"/>
+          </p:cNvPicPr>
+          <p:nvPr/>
+        </p:nvPicPr>
+        <p:blipFill>
+          <a:blip r:embed="rId3" cstate="print"/>
+          <a:srcRect/>
+          <a:stretch>
+            <a:fillRect/>
+          </a:stretch>
+        </p:blipFill>
+        <p:spPr bwMode="auto">
+          <a:xfrm>
+            <a:off x="0" y="0"/>
+            <a:ext cx="1331640" cy="1363870"/>
+          </a:xfrm>
+          <a:prstGeom prst="rect">
+            <a:avLst/>
+          </a:prstGeom>
+          <a:noFill/>
+        </p:spPr>
+      </p:pic>
     </p:spTree>
   </p:cSld>
   <p:clrMapOvr>
@@ -28815,7 +29404,7 @@
                   <a:srgbClr val="000000"/>
                 </a:solidFill>
               </a:rPr>
-              <a:t>Công nhân</a:t>
+              <a:t>Nội trợ</a:t>
             </a:r>
             <a:endParaRPr lang="en-US" sz="1200" b="1">
               <a:solidFill>
@@ -29731,7 +30320,7 @@
                   <a:srgbClr val="000000"/>
                 </a:solidFill>
               </a:rPr>
-              <a:t>Nội trợ</a:t>
+              <a:t>Đối tượng khác</a:t>
             </a:r>
             <a:endParaRPr lang="en-US" sz="1200" b="1">
               <a:solidFill>
@@ -30116,7 +30705,7 @@
                   <a:srgbClr val="000000"/>
                 </a:solidFill>
               </a:rPr>
-              <a:t>Đối tượng khác</a:t>
+              <a:t>Doanh nhân</a:t>
             </a:r>
             <a:endParaRPr lang="en-US" sz="1200" b="1">
               <a:solidFill>
@@ -39957,7 +40546,7 @@
         <p:spPr bwMode="gray">
           <a:xfrm>
             <a:off x="4527550" y="2865438"/>
-            <a:ext cx="4038600" cy="592137"/>
+            <a:ext cx="4148906" cy="592137"/>
           </a:xfrm>
           <a:prstGeom prst="roundRect">
             <a:avLst>
@@ -40231,7 +40820,7 @@
         <p:spPr bwMode="gray">
           <a:xfrm>
             <a:off x="4527550" y="3633788"/>
-            <a:ext cx="4038600" cy="592137"/>
+            <a:ext cx="4148906" cy="592137"/>
           </a:xfrm>
           <a:prstGeom prst="roundRect">
             <a:avLst>
@@ -40505,7 +41094,7 @@
         <p:spPr bwMode="gray">
           <a:xfrm>
             <a:off x="4527550" y="4410075"/>
-            <a:ext cx="4038600" cy="592138"/>
+            <a:ext cx="4148906" cy="592138"/>
           </a:xfrm>
           <a:prstGeom prst="roundRect">
             <a:avLst>
@@ -40716,7 +41305,7 @@
         <p:spPr bwMode="gray">
           <a:xfrm>
             <a:off x="5140325" y="4511675"/>
-            <a:ext cx="2159566" cy="369332"/>
+            <a:ext cx="3480440" cy="369332"/>
           </a:xfrm>
           <a:prstGeom prst="rect">
             <a:avLst/>
@@ -40758,7 +41347,15 @@
                   <a:srgbClr val="FFFFFF"/>
                 </a:solidFill>
               </a:rPr>
-              <a:t>Xem giá món ăn</a:t>
+              <a:t>Xem giá món </a:t>
+            </a:r>
+            <a:r>
+              <a:rPr lang="en-US" smtClean="0">
+                <a:solidFill>
+                  <a:srgbClr val="FFFFFF"/>
+                </a:solidFill>
+              </a:rPr>
+              <a:t>ăn và bình luận</a:t>
             </a:r>
             <a:endParaRPr lang="en-US">
               <a:solidFill>
@@ -40779,7 +41376,7 @@
         <p:spPr bwMode="gray">
           <a:xfrm>
             <a:off x="4527550" y="5146675"/>
-            <a:ext cx="4038600" cy="592138"/>
+            <a:ext cx="4148906" cy="592138"/>
           </a:xfrm>
           <a:prstGeom prst="roundRect">
             <a:avLst>

</xml_diff>